<commit_message>
Smoldyn version 2.60; works on Windows
</commit_message>
<xml_diff>
--- a/documentation/Smoldyn/QuickStart.pptx
+++ b/documentation/Smoldyn/QuickStart.pptx
@@ -286,7 +286,7 @@
           <a:lstStyle/>
           <a:p>
             <a:fld id="{0FE41FE7-18F3-9946-9CB8-A0CB88D412F3}" type="datetimeFigureOut">
-              <a:t>10/6/14</a:t>
+              <a:t>6/6/19</a:t>
             </a:fld>
             <a:endParaRPr lang="en-US"/>
           </a:p>
@@ -452,7 +452,7 @@
           <a:lstStyle/>
           <a:p>
             <a:fld id="{0FE41FE7-18F3-9946-9CB8-A0CB88D412F3}" type="datetimeFigureOut">
-              <a:t>10/6/14</a:t>
+              <a:t>6/6/19</a:t>
             </a:fld>
             <a:endParaRPr lang="en-US"/>
           </a:p>
@@ -628,7 +628,7 @@
           <a:lstStyle/>
           <a:p>
             <a:fld id="{0FE41FE7-18F3-9946-9CB8-A0CB88D412F3}" type="datetimeFigureOut">
-              <a:t>10/6/14</a:t>
+              <a:t>6/6/19</a:t>
             </a:fld>
             <a:endParaRPr lang="en-US"/>
           </a:p>
@@ -794,7 +794,7 @@
           <a:lstStyle/>
           <a:p>
             <a:fld id="{0FE41FE7-18F3-9946-9CB8-A0CB88D412F3}" type="datetimeFigureOut">
-              <a:t>10/6/14</a:t>
+              <a:t>6/6/19</a:t>
             </a:fld>
             <a:endParaRPr lang="en-US"/>
           </a:p>
@@ -1037,7 +1037,7 @@
           <a:lstStyle/>
           <a:p>
             <a:fld id="{0FE41FE7-18F3-9946-9CB8-A0CB88D412F3}" type="datetimeFigureOut">
-              <a:t>10/6/14</a:t>
+              <a:t>6/6/19</a:t>
             </a:fld>
             <a:endParaRPr lang="en-US"/>
           </a:p>
@@ -1320,7 +1320,7 @@
           <a:lstStyle/>
           <a:p>
             <a:fld id="{0FE41FE7-18F3-9946-9CB8-A0CB88D412F3}" type="datetimeFigureOut">
-              <a:t>10/6/14</a:t>
+              <a:t>6/6/19</a:t>
             </a:fld>
             <a:endParaRPr lang="en-US"/>
           </a:p>
@@ -1742,7 +1742,7 @@
           <a:lstStyle/>
           <a:p>
             <a:fld id="{0FE41FE7-18F3-9946-9CB8-A0CB88D412F3}" type="datetimeFigureOut">
-              <a:t>10/6/14</a:t>
+              <a:t>6/6/19</a:t>
             </a:fld>
             <a:endParaRPr lang="en-US"/>
           </a:p>
@@ -1857,7 +1857,7 @@
           <a:lstStyle/>
           <a:p>
             <a:fld id="{0FE41FE7-18F3-9946-9CB8-A0CB88D412F3}" type="datetimeFigureOut">
-              <a:t>10/6/14</a:t>
+              <a:t>6/6/19</a:t>
             </a:fld>
             <a:endParaRPr lang="en-US"/>
           </a:p>
@@ -1950,7 +1950,7 @@
           <a:lstStyle/>
           <a:p>
             <a:fld id="{0FE41FE7-18F3-9946-9CB8-A0CB88D412F3}" type="datetimeFigureOut">
-              <a:t>10/6/14</a:t>
+              <a:t>6/6/19</a:t>
             </a:fld>
             <a:endParaRPr lang="en-US"/>
           </a:p>
@@ -2223,7 +2223,7 @@
           <a:lstStyle/>
           <a:p>
             <a:fld id="{0FE41FE7-18F3-9946-9CB8-A0CB88D412F3}" type="datetimeFigureOut">
-              <a:t>10/6/14</a:t>
+              <a:t>6/6/19</a:t>
             </a:fld>
             <a:endParaRPr lang="en-US"/>
           </a:p>
@@ -2473,7 +2473,7 @@
           <a:lstStyle/>
           <a:p>
             <a:fld id="{0FE41FE7-18F3-9946-9CB8-A0CB88D412F3}" type="datetimeFigureOut">
-              <a:t>10/6/14</a:t>
+              <a:t>6/6/19</a:t>
             </a:fld>
             <a:endParaRPr lang="en-US"/>
           </a:p>
@@ -2682,7 +2682,7 @@
           </a:lstStyle>
           <a:p>
             <a:fld id="{0FE41FE7-18F3-9946-9CB8-A0CB88D412F3}" type="datetimeFigureOut">
-              <a:t>10/6/14</a:t>
+              <a:t>6/6/19</a:t>
             </a:fld>
             <a:endParaRPr lang="en-US"/>
           </a:p>
@@ -3265,7 +3265,7 @@
                 <a:latin typeface="Times"/>
                 <a:cs typeface="Times"/>
               </a:rPr>
-              <a:t>Windows: Get a command prompt with Start/All programs/Accessories/Command prompt.  The executable is smoldyn.exe 	and necessary dll files should be in the Windows directory.</a:t>
+              <a:t>Windows: Get a command prompt with Start &gt; Windows System &gt; Command prompt. Either install with install.bat or just 	run Smoldyn with smoldyn.exe.</a:t>
             </a:r>
           </a:p>
           <a:p>
@@ -3274,7 +3274,7 @@
                 <a:latin typeface="Times"/>
                 <a:cs typeface="Times"/>
               </a:rPr>
-              <a:t>Linux: Build from source using CMake.</a:t>
+              <a:t>Linux: Build from source using CMake or get pre-compiled code by following links from the Smoldyn download page.</a:t>
             </a:r>
             <a:endParaRPr lang="en-US" sz="1000">
               <a:latin typeface="Monaco"/>
@@ -3412,7 +3412,7 @@
                 <a:latin typeface="Monaco"/>
                 <a:cs typeface="Monaco"/>
               </a:rPr>
-              <a:t>boundaries 0 -1 1</a:t>
+              <a:t>boundaries x -1 1</a:t>
             </a:r>
           </a:p>
           <a:p>
@@ -3421,7 +3421,7 @@
                 <a:latin typeface="Monaco"/>
                 <a:cs typeface="Monaco"/>
               </a:rPr>
-              <a:t>boundaries 1 -1 1</a:t>
+              <a:t>boundaries y -1 1</a:t>
             </a:r>
           </a:p>
           <a:p>
@@ -3846,7 +3846,7 @@
         <p:spPr>
           <a:xfrm>
             <a:off x="4630227" y="2250599"/>
-            <a:ext cx="1788483" cy="400110"/>
+            <a:ext cx="1628101" cy="369332"/>
           </a:xfrm>
           <a:prstGeom prst="rect">
             <a:avLst/>
@@ -3860,13 +3860,19 @@
           <a:lstStyle/>
           <a:p>
             <a:r>
-              <a:rPr lang="en-US" sz="1000"/>
+              <a:rPr lang="en-US" sz="900">
+                <a:latin typeface="Arial"/>
+                <a:cs typeface="Arial"/>
+              </a:rPr>
               <a:t>comments with author, date,</a:t>
             </a:r>
           </a:p>
           <a:p>
             <a:r>
-              <a:rPr lang="en-US" sz="1000"/>
+              <a:rPr lang="en-US" sz="900">
+                <a:latin typeface="Arial"/>
+                <a:cs typeface="Arial"/>
+              </a:rPr>
               <a:t>availablility and units</a:t>
             </a:r>
           </a:p>
@@ -3920,7 +3926,7 @@
         <p:spPr>
           <a:xfrm>
             <a:off x="2166822" y="2825795"/>
-            <a:ext cx="4333313" cy="246221"/>
+            <a:ext cx="3918448" cy="230832"/>
           </a:xfrm>
           <a:prstGeom prst="rect">
             <a:avLst/>
@@ -3934,7 +3940,10 @@
           <a:lstStyle/>
           <a:p>
             <a:r>
-              <a:rPr lang="en-US" sz="1000"/>
+              <a:rPr lang="en-US" sz="900">
+                <a:latin typeface="Arial"/>
+                <a:cs typeface="Arial"/>
+              </a:rPr>
               <a:t>define statements for text replacement.  Helps keep parameters together.</a:t>
             </a:r>
           </a:p>
@@ -3988,7 +3997,7 @@
         <p:spPr>
           <a:xfrm>
             <a:off x="2166822" y="3492538"/>
-            <a:ext cx="4090733" cy="246221"/>
+            <a:ext cx="3700127" cy="230832"/>
           </a:xfrm>
           <a:prstGeom prst="rect">
             <a:avLst/>
@@ -4002,7 +4011,10 @@
           <a:lstStyle/>
           <a:p>
             <a:r>
-              <a:rPr lang="en-US" sz="1000"/>
+              <a:rPr lang="en-US" sz="900">
+                <a:latin typeface="Arial"/>
+                <a:cs typeface="Arial"/>
+              </a:rPr>
               <a:t>system dimensionality (1 to 3), outer boundaries, and simulation time</a:t>
             </a:r>
           </a:p>
@@ -4056,7 +4068,7 @@
         <p:spPr>
           <a:xfrm>
             <a:off x="2166822" y="4265119"/>
-            <a:ext cx="4456731" cy="553998"/>
+            <a:ext cx="4029525" cy="507831"/>
           </a:xfrm>
           <a:prstGeom prst="rect">
             <a:avLst/>
@@ -4070,19 +4082,28 @@
           <a:lstStyle/>
           <a:p>
             <a:r>
-              <a:rPr lang="en-US" sz="1000"/>
+              <a:rPr lang="en-US" sz="900">
+                <a:latin typeface="Arial"/>
+                <a:cs typeface="Arial"/>
+              </a:rPr>
               <a:t>list of species (S = substrate, E = enzyme, ES = complex, P = product)</a:t>
             </a:r>
           </a:p>
           <a:p>
             <a:r>
-              <a:rPr lang="en-US" sz="1000"/>
+              <a:rPr lang="en-US" sz="900">
+                <a:latin typeface="Arial"/>
+                <a:cs typeface="Arial"/>
+              </a:rPr>
               <a:t>other species information, with diffusion coefficients, color, display size, etc.</a:t>
             </a:r>
           </a:p>
           <a:p>
             <a:r>
-              <a:rPr lang="en-US" sz="1000"/>
+              <a:rPr lang="en-US" sz="900">
+                <a:latin typeface="Arial"/>
+                <a:cs typeface="Arial"/>
+              </a:rPr>
               <a:t>Can also list drift velocity or anisotropic diffusion matrix.</a:t>
             </a:r>
           </a:p>
@@ -4136,7 +4157,7 @@
         <p:spPr>
           <a:xfrm>
             <a:off x="2166822" y="5439869"/>
-            <a:ext cx="3040453" cy="246221"/>
+            <a:ext cx="2684374" cy="230832"/>
           </a:xfrm>
           <a:prstGeom prst="rect">
             <a:avLst/>
@@ -4150,7 +4171,10 @@
           <a:lstStyle/>
           <a:p>
             <a:r>
-              <a:rPr lang="en-US" sz="1000"/>
+              <a:rPr lang="en-US" sz="900">
+                <a:latin typeface="Arial"/>
+                <a:cs typeface="Arial"/>
+              </a:rPr>
               <a:t>graphics quality, and system drawing instructions</a:t>
             </a:r>
           </a:p>
@@ -4204,7 +4228,7 @@
         <p:spPr>
           <a:xfrm>
             <a:off x="2166822" y="5820871"/>
-            <a:ext cx="4540263" cy="553998"/>
+            <a:ext cx="4104703" cy="507831"/>
           </a:xfrm>
           <a:prstGeom prst="rect">
             <a:avLst/>
@@ -4218,19 +4242,28 @@
           <a:lstStyle/>
           <a:p>
             <a:r>
-              <a:rPr lang="en-US" sz="1000"/>
+              <a:rPr lang="en-US" sz="900">
+                <a:latin typeface="Arial"/>
+                <a:cs typeface="Arial"/>
+              </a:rPr>
               <a:t>block with surface name and definition.  action gives molecule behavior upon</a:t>
             </a:r>
           </a:p>
           <a:p>
             <a:r>
-              <a:rPr lang="en-US" sz="1000"/>
+              <a:rPr lang="en-US" sz="900">
+                <a:latin typeface="Arial"/>
+                <a:cs typeface="Arial"/>
+              </a:rPr>
               <a:t>contact with front and back surface faces.  rate gives adsorption, desorption,</a:t>
             </a:r>
           </a:p>
           <a:p>
             <a:r>
-              <a:rPr lang="en-US" sz="1000"/>
+              <a:rPr lang="en-US" sz="900">
+                <a:latin typeface="Arial"/>
+                <a:cs typeface="Arial"/>
+              </a:rPr>
               <a:t>and transmission rate.  List surface panels and graphics attributes.</a:t>
             </a:r>
           </a:p>
@@ -4284,7 +4317,7 @@
         <p:spPr>
           <a:xfrm>
             <a:off x="3796650" y="6572286"/>
-            <a:ext cx="2826904" cy="400110"/>
+            <a:ext cx="2826904" cy="369332"/>
           </a:xfrm>
           <a:prstGeom prst="rect">
             <a:avLst/>
@@ -4298,13 +4331,19 @@
           <a:lstStyle/>
           <a:p>
             <a:r>
-              <a:rPr lang="en-US" sz="1000"/>
+              <a:rPr lang="en-US" sz="900">
+                <a:latin typeface="Arial"/>
+                <a:cs typeface="Arial"/>
+              </a:rPr>
               <a:t>reaction list with reactions and reaction rates.</a:t>
             </a:r>
           </a:p>
           <a:p>
             <a:r>
-              <a:rPr lang="en-US" sz="1000"/>
+              <a:rPr lang="en-US" sz="900">
+                <a:latin typeface="Arial"/>
+                <a:cs typeface="Arial"/>
+              </a:rPr>
               <a:t>product_placement is for reversible reactions.</a:t>
             </a:r>
           </a:p>
@@ -4358,7 +4397,7 @@
         <p:spPr>
           <a:xfrm>
             <a:off x="2192692" y="7282037"/>
-            <a:ext cx="4233501" cy="400110"/>
+            <a:ext cx="3828617" cy="369332"/>
           </a:xfrm>
           <a:prstGeom prst="rect">
             <a:avLst/>
@@ -4372,13 +4411,19 @@
           <a:lstStyle/>
           <a:p>
             <a:r>
-              <a:rPr lang="en-US" sz="1000"/>
+              <a:rPr lang="en-US" sz="900">
+                <a:latin typeface="Arial"/>
+                <a:cs typeface="Arial"/>
+              </a:rPr>
               <a:t>block with compartment name and definition.  A compartment is defined</a:t>
             </a:r>
           </a:p>
           <a:p>
             <a:r>
-              <a:rPr lang="en-US" sz="1000"/>
+              <a:rPr lang="en-US" sz="900">
+                <a:latin typeface="Arial"/>
+                <a:cs typeface="Arial"/>
+              </a:rPr>
               <a:t>by bounding surfaces and one or more “interior-defining points”</a:t>
             </a:r>
           </a:p>
@@ -4432,7 +4477,7 @@
         <p:spPr>
           <a:xfrm>
             <a:off x="3119315" y="7863445"/>
-            <a:ext cx="2579715" cy="246221"/>
+            <a:ext cx="2340210" cy="230832"/>
           </a:xfrm>
           <a:prstGeom prst="rect">
             <a:avLst/>
@@ -4446,7 +4491,10 @@
           <a:lstStyle/>
           <a:p>
             <a:r>
-              <a:rPr lang="en-US" sz="1000"/>
+              <a:rPr lang="en-US" sz="900">
+                <a:latin typeface="Arial"/>
+                <a:cs typeface="Arial"/>
+              </a:rPr>
               <a:t>molecule placements for starting condition</a:t>
             </a:r>
           </a:p>
@@ -4500,7 +4548,7 @@
         <p:spPr>
           <a:xfrm>
             <a:off x="3119315" y="8265611"/>
-            <a:ext cx="3442331" cy="400110"/>
+            <a:ext cx="3116565" cy="369332"/>
           </a:xfrm>
           <a:prstGeom prst="rect">
             <a:avLst/>
@@ -4514,13 +4562,19 @@
           <a:lstStyle/>
           <a:p>
             <a:r>
-              <a:rPr lang="en-US" sz="1000"/>
+              <a:rPr lang="en-US" sz="900">
+                <a:latin typeface="Arial"/>
+                <a:cs typeface="Arial"/>
+              </a:rPr>
               <a:t>simulation output.  text_display is to graphics window and</a:t>
             </a:r>
           </a:p>
           <a:p>
             <a:r>
-              <a:rPr lang="en-US" sz="1000"/>
+              <a:rPr lang="en-US" sz="900">
+                <a:latin typeface="Arial"/>
+                <a:cs typeface="Arial"/>
+              </a:rPr>
               <a:t>rest is to MMBexampleout.txt file for post-processing.</a:t>
             </a:r>
           </a:p>
@@ -4610,7 +4664,7 @@
         <p:spPr>
           <a:xfrm>
             <a:off x="2166822" y="8731570"/>
-            <a:ext cx="1567632" cy="246221"/>
+            <a:ext cx="1429335" cy="230832"/>
           </a:xfrm>
           <a:prstGeom prst="rect">
             <a:avLst/>
@@ -4624,7 +4678,10 @@
           <a:lstStyle/>
           <a:p>
             <a:r>
-              <a:rPr lang="en-US" sz="1000"/>
+              <a:rPr lang="en-US" sz="900">
+                <a:latin typeface="Arial"/>
+                <a:cs typeface="Arial"/>
+              </a:rPr>
               <a:t>end of the simulation file</a:t>
             </a:r>
           </a:p>
@@ -5282,7 +5339,7 @@
         <p:spPr>
           <a:xfrm>
             <a:off x="310455" y="4566483"/>
-            <a:ext cx="5415128" cy="1754327"/>
+            <a:ext cx="5415128" cy="1615827"/>
           </a:xfrm>
           <a:prstGeom prst="rect">
             <a:avLst/>
@@ -5296,627 +5353,1150 @@
           <a:lstStyle/>
           <a:p>
             <a:r>
-              <a:rPr lang="en-US" sz="900"/>
+              <a:rPr lang="en-US" sz="900">
+                <a:latin typeface="Arial"/>
+                <a:cs typeface="Arial"/>
+              </a:rPr>
               <a:t>			Diffusion		Unimolec.	Bimolecular	   Adsorption</a:t>
             </a:r>
           </a:p>
           <a:p>
             <a:r>
-              <a:rPr lang="en-US" sz="900"/>
+              <a:rPr lang="en-US" sz="900">
+                <a:latin typeface="Arial"/>
+                <a:cs typeface="Arial"/>
+              </a:rPr>
               <a:t>	</a:t>
             </a:r>
             <a:r>
-              <a:rPr lang="en-US" sz="900" u="sng"/>
+              <a:rPr lang="en-US" sz="900" u="sng">
+                <a:latin typeface="Arial"/>
+                <a:cs typeface="Arial"/>
+              </a:rPr>
               <a:t>Concentration	coefficient	reactions	reactions	   rates           </a:t>
             </a:r>
-            <a:endParaRPr lang="en-US" sz="900"/>
-          </a:p>
-          <a:p>
-            <a:r>
-              <a:rPr lang="en-US" sz="900"/>
+            <a:endParaRPr lang="en-US" sz="900">
+              <a:latin typeface="Arial"/>
+              <a:cs typeface="Arial"/>
+            </a:endParaRPr>
+          </a:p>
+          <a:p>
+            <a:r>
+              <a:rPr lang="en-US" sz="900">
+                <a:latin typeface="Arial"/>
+                <a:cs typeface="Arial"/>
+              </a:rPr>
               <a:t>Typical	10 μM		10 μm</a:t>
             </a:r>
             <a:r>
-              <a:rPr lang="en-US" sz="900" baseline="30000"/>
+              <a:rPr lang="en-US" sz="900" baseline="30000">
+                <a:latin typeface="Arial"/>
+                <a:cs typeface="Arial"/>
+              </a:rPr>
               <a:t>2</a:t>
             </a:r>
             <a:r>
-              <a:rPr lang="en-US" sz="900"/>
+              <a:rPr lang="en-US" sz="900">
+                <a:latin typeface="Arial"/>
+                <a:cs typeface="Arial"/>
+              </a:rPr>
               <a:t>s</a:t>
             </a:r>
             <a:r>
-              <a:rPr lang="en-US" sz="900" baseline="30000"/>
+              <a:rPr lang="en-US" sz="900" baseline="30000">
+                <a:latin typeface="Arial"/>
+                <a:cs typeface="Arial"/>
+              </a:rPr>
               <a:t>–1</a:t>
             </a:r>
             <a:r>
-              <a:rPr lang="en-US" sz="900"/>
+              <a:rPr lang="en-US" sz="900">
+                <a:latin typeface="Arial"/>
+                <a:cs typeface="Arial"/>
+              </a:rPr>
               <a:t>	1 s</a:t>
             </a:r>
             <a:r>
-              <a:rPr lang="en-US" sz="900" baseline="30000"/>
+              <a:rPr lang="en-US" sz="900" baseline="30000">
+                <a:latin typeface="Arial"/>
+                <a:cs typeface="Arial"/>
+              </a:rPr>
               <a:t>–1</a:t>
             </a:r>
             <a:r>
-              <a:rPr lang="en-US" sz="900"/>
+              <a:rPr lang="en-US" sz="900">
+                <a:latin typeface="Arial"/>
+                <a:cs typeface="Arial"/>
+              </a:rPr>
               <a:t>		10</a:t>
             </a:r>
             <a:r>
-              <a:rPr lang="en-US" sz="900" baseline="30000"/>
+              <a:rPr lang="en-US" sz="900" baseline="30000">
+                <a:latin typeface="Arial"/>
+                <a:cs typeface="Arial"/>
+              </a:rPr>
               <a:t>5</a:t>
             </a:r>
             <a:r>
-              <a:rPr lang="en-US" sz="900"/>
+              <a:rPr lang="en-US" sz="900">
+                <a:latin typeface="Arial"/>
+                <a:cs typeface="Arial"/>
+              </a:rPr>
               <a:t> M</a:t>
             </a:r>
             <a:r>
-              <a:rPr lang="en-US" sz="900" baseline="30000"/>
+              <a:rPr lang="en-US" sz="900" baseline="30000">
+                <a:latin typeface="Arial"/>
+                <a:cs typeface="Arial"/>
+              </a:rPr>
               <a:t>–1</a:t>
             </a:r>
             <a:r>
-              <a:rPr lang="en-US" sz="900"/>
+              <a:rPr lang="en-US" sz="900">
+                <a:latin typeface="Arial"/>
+                <a:cs typeface="Arial"/>
+              </a:rPr>
               <a:t>s</a:t>
             </a:r>
             <a:r>
-              <a:rPr lang="en-US" sz="900" baseline="30000"/>
+              <a:rPr lang="en-US" sz="900" baseline="30000">
+                <a:latin typeface="Arial"/>
+                <a:cs typeface="Arial"/>
+              </a:rPr>
               <a:t>–1</a:t>
             </a:r>
             <a:r>
-              <a:rPr lang="en-US" sz="900"/>
-              <a:t>	   1 μm s</a:t>
-            </a:r>
-            <a:r>
-              <a:rPr lang="en-US" sz="900" baseline="30000"/>
+              <a:rPr lang="en-US" sz="900">
+                <a:latin typeface="Arial"/>
+                <a:cs typeface="Arial"/>
+              </a:rPr>
+              <a:t>	  </a:t>
+            </a:r>
+            <a:r>
+              <a:rPr lang="en-US" sz="900">
+                <a:latin typeface="Arial"/>
+                <a:cs typeface="Arial"/>
+              </a:rPr>
+              <a:t>1 μm s</a:t>
+            </a:r>
+            <a:r>
+              <a:rPr lang="en-US" sz="900" baseline="30000">
+                <a:latin typeface="Arial"/>
+                <a:cs typeface="Arial"/>
+              </a:rPr>
               <a:t>–1</a:t>
             </a:r>
-            <a:endParaRPr lang="en-US" sz="900"/>
-          </a:p>
-          <a:p>
-            <a:r>
-              <a:rPr lang="en-US" sz="900"/>
+            <a:endParaRPr lang="en-US" sz="900">
+              <a:latin typeface="Arial"/>
+              <a:cs typeface="Arial"/>
+            </a:endParaRPr>
+          </a:p>
+          <a:p>
+            <a:r>
+              <a:rPr lang="en-US" sz="900">
+                <a:latin typeface="Arial"/>
+                <a:cs typeface="Arial"/>
+              </a:rPr>
               <a:t>mks	6x10</a:t>
             </a:r>
             <a:r>
-              <a:rPr lang="en-US" sz="900" baseline="30000"/>
+              <a:rPr lang="en-US" sz="900" baseline="30000">
+                <a:latin typeface="Arial"/>
+                <a:cs typeface="Arial"/>
+              </a:rPr>
               <a:t>21</a:t>
             </a:r>
             <a:r>
-              <a:rPr lang="en-US" sz="900"/>
+              <a:rPr lang="en-US" sz="900">
+                <a:latin typeface="Arial"/>
+                <a:cs typeface="Arial"/>
+              </a:rPr>
               <a:t> m</a:t>
             </a:r>
             <a:r>
-              <a:rPr lang="en-US" sz="900" baseline="30000"/>
+              <a:rPr lang="en-US" sz="900" baseline="30000">
+                <a:latin typeface="Arial"/>
+                <a:cs typeface="Arial"/>
+              </a:rPr>
               <a:t>–3</a:t>
             </a:r>
             <a:r>
-              <a:rPr lang="en-US" sz="900"/>
+              <a:rPr lang="en-US" sz="900">
+                <a:latin typeface="Arial"/>
+                <a:cs typeface="Arial"/>
+              </a:rPr>
               <a:t>	10</a:t>
             </a:r>
             <a:r>
-              <a:rPr lang="en-US" sz="900" baseline="30000"/>
+              <a:rPr lang="en-US" sz="900" baseline="30000">
+                <a:latin typeface="Arial"/>
+                <a:cs typeface="Arial"/>
+              </a:rPr>
               <a:t>–11</a:t>
             </a:r>
             <a:r>
-              <a:rPr lang="en-US" sz="900"/>
+              <a:rPr lang="en-US" sz="900">
+                <a:latin typeface="Arial"/>
+                <a:cs typeface="Arial"/>
+              </a:rPr>
               <a:t> m</a:t>
             </a:r>
             <a:r>
-              <a:rPr lang="en-US" sz="900" baseline="30000"/>
+              <a:rPr lang="en-US" sz="900" baseline="30000">
+                <a:latin typeface="Arial"/>
+                <a:cs typeface="Arial"/>
+              </a:rPr>
               <a:t>2</a:t>
             </a:r>
             <a:r>
-              <a:rPr lang="en-US" sz="900"/>
+              <a:rPr lang="en-US" sz="900">
+                <a:latin typeface="Arial"/>
+                <a:cs typeface="Arial"/>
+              </a:rPr>
               <a:t>s</a:t>
             </a:r>
             <a:r>
-              <a:rPr lang="en-US" sz="900" baseline="30000"/>
+              <a:rPr lang="en-US" sz="900" baseline="30000">
+                <a:latin typeface="Arial"/>
+                <a:cs typeface="Arial"/>
+              </a:rPr>
               <a:t>–1</a:t>
             </a:r>
             <a:r>
-              <a:rPr lang="en-US" sz="900"/>
+              <a:rPr lang="en-US" sz="900">
+                <a:latin typeface="Arial"/>
+                <a:cs typeface="Arial"/>
+              </a:rPr>
               <a:t>	1 s</a:t>
             </a:r>
             <a:r>
-              <a:rPr lang="en-US" sz="900" baseline="30000"/>
+              <a:rPr lang="en-US" sz="900" baseline="30000">
+                <a:latin typeface="Arial"/>
+                <a:cs typeface="Arial"/>
+              </a:rPr>
               <a:t>–1</a:t>
             </a:r>
             <a:r>
-              <a:rPr lang="en-US" sz="900"/>
+              <a:rPr lang="en-US" sz="900">
+                <a:latin typeface="Arial"/>
+                <a:cs typeface="Arial"/>
+              </a:rPr>
               <a:t>		10</a:t>
             </a:r>
             <a:r>
-              <a:rPr lang="en-US" sz="900" baseline="30000"/>
+              <a:rPr lang="en-US" sz="900" baseline="30000">
+                <a:latin typeface="Arial"/>
+                <a:cs typeface="Arial"/>
+              </a:rPr>
               <a:t>2</a:t>
             </a:r>
             <a:r>
-              <a:rPr lang="en-US" sz="900"/>
+              <a:rPr lang="en-US" sz="900">
+                <a:latin typeface="Arial"/>
+                <a:cs typeface="Arial"/>
+              </a:rPr>
               <a:t> m</a:t>
             </a:r>
             <a:r>
-              <a:rPr lang="en-US" sz="900" baseline="30000"/>
+              <a:rPr lang="en-US" sz="900" baseline="30000">
+                <a:latin typeface="Arial"/>
+                <a:cs typeface="Arial"/>
+              </a:rPr>
               <a:t>3</a:t>
             </a:r>
             <a:r>
-              <a:rPr lang="en-US" sz="900"/>
+              <a:rPr lang="en-US" sz="900">
+                <a:latin typeface="Arial"/>
+                <a:cs typeface="Arial"/>
+              </a:rPr>
               <a:t>mol</a:t>
             </a:r>
             <a:r>
-              <a:rPr lang="en-US" sz="900" baseline="30000"/>
+              <a:rPr lang="en-US" sz="900" baseline="30000">
+                <a:latin typeface="Arial"/>
+                <a:cs typeface="Arial"/>
+              </a:rPr>
               <a:t>–1</a:t>
             </a:r>
             <a:r>
-              <a:rPr lang="en-US" sz="900"/>
+              <a:rPr lang="en-US" sz="900">
+                <a:latin typeface="Arial"/>
+                <a:cs typeface="Arial"/>
+              </a:rPr>
               <a:t>s</a:t>
             </a:r>
             <a:r>
-              <a:rPr lang="en-US" sz="900" baseline="30000"/>
+              <a:rPr lang="en-US" sz="900" baseline="30000">
+                <a:latin typeface="Arial"/>
+                <a:cs typeface="Arial"/>
+              </a:rPr>
               <a:t>–1</a:t>
             </a:r>
             <a:r>
-              <a:rPr lang="en-US" sz="900"/>
-              <a:t>	   10</a:t>
-            </a:r>
-            <a:r>
-              <a:rPr lang="en-US" sz="900" baseline="30000"/>
+              <a:rPr lang="en-US" sz="900">
+                <a:latin typeface="Arial"/>
+                <a:cs typeface="Arial"/>
+              </a:rPr>
+              <a:t>	  </a:t>
+            </a:r>
+            <a:r>
+              <a:rPr lang="en-US" sz="900">
+                <a:latin typeface="Arial"/>
+                <a:cs typeface="Arial"/>
+              </a:rPr>
+              <a:t>10</a:t>
+            </a:r>
+            <a:r>
+              <a:rPr lang="en-US" sz="900" baseline="30000">
+                <a:latin typeface="Arial"/>
+                <a:cs typeface="Arial"/>
+              </a:rPr>
               <a:t>–6</a:t>
             </a:r>
             <a:r>
-              <a:rPr lang="en-US" sz="900"/>
+              <a:rPr lang="en-US" sz="900">
+                <a:latin typeface="Arial"/>
+                <a:cs typeface="Arial"/>
+              </a:rPr>
               <a:t> m s</a:t>
             </a:r>
             <a:r>
-              <a:rPr lang="en-US" sz="900" baseline="30000"/>
+              <a:rPr lang="en-US" sz="900" baseline="30000">
+                <a:latin typeface="Arial"/>
+                <a:cs typeface="Arial"/>
+              </a:rPr>
               <a:t>–1</a:t>
             </a:r>
-            <a:endParaRPr lang="en-US" sz="900"/>
-          </a:p>
-          <a:p>
-            <a:r>
-              <a:rPr lang="en-US" sz="900"/>
-              <a:t>							 1.7x10</a:t>
-            </a:r>
-            <a:r>
-              <a:rPr lang="en-US" sz="900" baseline="30000"/>
+            <a:endParaRPr lang="en-US" sz="900">
+              <a:latin typeface="Arial"/>
+              <a:cs typeface="Arial"/>
+            </a:endParaRPr>
+          </a:p>
+          <a:p>
+            <a:r>
+              <a:rPr lang="en-US" sz="900">
+                <a:latin typeface="Arial"/>
+                <a:cs typeface="Arial"/>
+              </a:rPr>
+              <a:t>							1.7x10</a:t>
+            </a:r>
+            <a:r>
+              <a:rPr lang="en-US" sz="900" baseline="30000">
+                <a:latin typeface="Arial"/>
+                <a:cs typeface="Arial"/>
+              </a:rPr>
               <a:t>–22</a:t>
             </a:r>
             <a:r>
-              <a:rPr lang="en-US" sz="900"/>
+              <a:rPr lang="en-US" sz="900">
+                <a:latin typeface="Arial"/>
+                <a:cs typeface="Arial"/>
+              </a:rPr>
               <a:t> m</a:t>
             </a:r>
             <a:r>
-              <a:rPr lang="en-US" sz="900" baseline="30000"/>
+              <a:rPr lang="en-US" sz="900" baseline="30000">
+                <a:latin typeface="Arial"/>
+                <a:cs typeface="Arial"/>
+              </a:rPr>
               <a:t>3</a:t>
             </a:r>
             <a:r>
-              <a:rPr lang="en-US" sz="900"/>
+              <a:rPr lang="en-US" sz="900">
+                <a:latin typeface="Arial"/>
+                <a:cs typeface="Arial"/>
+              </a:rPr>
               <a:t>s</a:t>
             </a:r>
             <a:r>
-              <a:rPr lang="en-US" sz="900" baseline="30000"/>
+              <a:rPr lang="en-US" sz="900" baseline="30000">
+                <a:latin typeface="Arial"/>
+                <a:cs typeface="Arial"/>
+              </a:rPr>
               <a:t>–1</a:t>
             </a:r>
-            <a:endParaRPr lang="en-US" sz="900"/>
-          </a:p>
-          <a:p>
-            <a:r>
-              <a:rPr lang="en-US" sz="900"/>
+            <a:endParaRPr lang="en-US" sz="900">
+              <a:latin typeface="Arial"/>
+              <a:cs typeface="Arial"/>
+            </a:endParaRPr>
+          </a:p>
+          <a:p>
+            <a:r>
+              <a:rPr lang="en-US" sz="900">
+                <a:latin typeface="Arial"/>
+                <a:cs typeface="Arial"/>
+              </a:rPr>
               <a:t>cgs	6x10</a:t>
             </a:r>
             <a:r>
-              <a:rPr lang="en-US" sz="900" baseline="30000"/>
+              <a:rPr lang="en-US" sz="900" baseline="30000">
+                <a:latin typeface="Arial"/>
+                <a:cs typeface="Arial"/>
+              </a:rPr>
               <a:t>15</a:t>
             </a:r>
             <a:r>
-              <a:rPr lang="en-US" sz="900"/>
+              <a:rPr lang="en-US" sz="900">
+                <a:latin typeface="Arial"/>
+                <a:cs typeface="Arial"/>
+              </a:rPr>
               <a:t> cm</a:t>
             </a:r>
             <a:r>
-              <a:rPr lang="en-US" sz="900" baseline="30000"/>
+              <a:rPr lang="en-US" sz="900" baseline="30000">
+                <a:latin typeface="Arial"/>
+                <a:cs typeface="Arial"/>
+              </a:rPr>
               <a:t>–3</a:t>
             </a:r>
             <a:r>
-              <a:rPr lang="en-US" sz="900"/>
+              <a:rPr lang="en-US" sz="900">
+                <a:latin typeface="Arial"/>
+                <a:cs typeface="Arial"/>
+              </a:rPr>
               <a:t>	10</a:t>
             </a:r>
             <a:r>
-              <a:rPr lang="en-US" sz="900" baseline="30000"/>
+              <a:rPr lang="en-US" sz="900" baseline="30000">
+                <a:latin typeface="Arial"/>
+                <a:cs typeface="Arial"/>
+              </a:rPr>
               <a:t>–7</a:t>
             </a:r>
             <a:r>
-              <a:rPr lang="en-US" sz="900"/>
+              <a:rPr lang="en-US" sz="900">
+                <a:latin typeface="Arial"/>
+                <a:cs typeface="Arial"/>
+              </a:rPr>
               <a:t> cm</a:t>
             </a:r>
             <a:r>
-              <a:rPr lang="en-US" sz="900" baseline="30000"/>
+              <a:rPr lang="en-US" sz="900" baseline="30000">
+                <a:latin typeface="Arial"/>
+                <a:cs typeface="Arial"/>
+              </a:rPr>
               <a:t>2</a:t>
             </a:r>
             <a:r>
-              <a:rPr lang="en-US" sz="900"/>
+              <a:rPr lang="en-US" sz="900">
+                <a:latin typeface="Arial"/>
+                <a:cs typeface="Arial"/>
+              </a:rPr>
               <a:t>s</a:t>
             </a:r>
             <a:r>
-              <a:rPr lang="en-US" sz="900" baseline="30000"/>
+              <a:rPr lang="en-US" sz="900" baseline="30000">
+                <a:latin typeface="Arial"/>
+                <a:cs typeface="Arial"/>
+              </a:rPr>
               <a:t>–1</a:t>
             </a:r>
             <a:r>
-              <a:rPr lang="en-US" sz="900"/>
+              <a:rPr lang="en-US" sz="900">
+                <a:latin typeface="Arial"/>
+                <a:cs typeface="Arial"/>
+              </a:rPr>
               <a:t>	1 s</a:t>
             </a:r>
             <a:r>
-              <a:rPr lang="en-US" sz="900" baseline="30000"/>
+              <a:rPr lang="en-US" sz="900" baseline="30000">
+                <a:latin typeface="Arial"/>
+                <a:cs typeface="Arial"/>
+              </a:rPr>
               <a:t>–1</a:t>
             </a:r>
             <a:r>
-              <a:rPr lang="en-US" sz="900"/>
+              <a:rPr lang="en-US" sz="900">
+                <a:latin typeface="Arial"/>
+                <a:cs typeface="Arial"/>
+              </a:rPr>
               <a:t>		1.7x10</a:t>
             </a:r>
             <a:r>
-              <a:rPr lang="en-US" sz="900" baseline="30000"/>
+              <a:rPr lang="en-US" sz="900" baseline="30000">
+                <a:latin typeface="Arial"/>
+                <a:cs typeface="Arial"/>
+              </a:rPr>
               <a:t>–16</a:t>
             </a:r>
             <a:r>
-              <a:rPr lang="en-US" sz="900"/>
+              <a:rPr lang="en-US" sz="900">
+                <a:latin typeface="Arial"/>
+                <a:cs typeface="Arial"/>
+              </a:rPr>
               <a:t> cm</a:t>
             </a:r>
             <a:r>
-              <a:rPr lang="en-US" sz="900" baseline="30000"/>
+              <a:rPr lang="en-US" sz="900" baseline="30000">
+                <a:latin typeface="Arial"/>
+                <a:cs typeface="Arial"/>
+              </a:rPr>
               <a:t>3</a:t>
             </a:r>
             <a:r>
-              <a:rPr lang="en-US" sz="900"/>
+              <a:rPr lang="en-US" sz="900">
+                <a:latin typeface="Arial"/>
+                <a:cs typeface="Arial"/>
+              </a:rPr>
               <a:t>s</a:t>
             </a:r>
             <a:r>
-              <a:rPr lang="en-US" sz="900" baseline="30000"/>
+              <a:rPr lang="en-US" sz="900" baseline="30000">
+                <a:latin typeface="Arial"/>
+                <a:cs typeface="Arial"/>
+              </a:rPr>
               <a:t>–1</a:t>
             </a:r>
             <a:r>
-              <a:rPr lang="en-US" sz="900"/>
-              <a:t>	   10</a:t>
-            </a:r>
-            <a:r>
-              <a:rPr lang="en-US" sz="900" baseline="30000"/>
+              <a:rPr lang="en-US" sz="900">
+                <a:latin typeface="Arial"/>
+                <a:cs typeface="Arial"/>
+              </a:rPr>
+              <a:t>	  </a:t>
+            </a:r>
+            <a:r>
+              <a:rPr lang="en-US" sz="900">
+                <a:latin typeface="Arial"/>
+                <a:cs typeface="Arial"/>
+              </a:rPr>
+              <a:t>10</a:t>
+            </a:r>
+            <a:r>
+              <a:rPr lang="en-US" sz="900" baseline="30000">
+                <a:latin typeface="Arial"/>
+                <a:cs typeface="Arial"/>
+              </a:rPr>
               <a:t>–4</a:t>
             </a:r>
             <a:r>
-              <a:rPr lang="en-US" sz="900"/>
+              <a:rPr lang="en-US" sz="900">
+                <a:latin typeface="Arial"/>
+                <a:cs typeface="Arial"/>
+              </a:rPr>
               <a:t> cm s</a:t>
             </a:r>
             <a:r>
-              <a:rPr lang="en-US" sz="900" baseline="30000"/>
+              <a:rPr lang="en-US" sz="900" baseline="30000">
+                <a:latin typeface="Arial"/>
+                <a:cs typeface="Arial"/>
+              </a:rPr>
               <a:t>–1</a:t>
             </a:r>
-            <a:endParaRPr lang="en-US" sz="900"/>
-          </a:p>
-          <a:p>
-            <a:r>
-              <a:rPr lang="en-US" sz="900"/>
+            <a:endParaRPr lang="en-US" sz="900">
+              <a:latin typeface="Arial"/>
+              <a:cs typeface="Arial"/>
+            </a:endParaRPr>
+          </a:p>
+          <a:p>
+            <a:r>
+              <a:rPr lang="en-US" sz="900">
+                <a:latin typeface="Arial"/>
+                <a:cs typeface="Arial"/>
+              </a:rPr>
               <a:t>μm-ms	6000 μm</a:t>
             </a:r>
             <a:r>
-              <a:rPr lang="en-US" sz="900" baseline="30000"/>
+              <a:rPr lang="en-US" sz="900" baseline="30000">
+                <a:latin typeface="Arial"/>
+                <a:cs typeface="Arial"/>
+              </a:rPr>
               <a:t>–3</a:t>
             </a:r>
             <a:r>
-              <a:rPr lang="en-US" sz="900"/>
+              <a:rPr lang="en-US" sz="900">
+                <a:latin typeface="Arial"/>
+                <a:cs typeface="Arial"/>
+              </a:rPr>
               <a:t>	10</a:t>
             </a:r>
             <a:r>
-              <a:rPr lang="en-US" sz="900" baseline="30000"/>
+              <a:rPr lang="en-US" sz="900" baseline="30000">
+                <a:latin typeface="Arial"/>
+                <a:cs typeface="Arial"/>
+              </a:rPr>
               <a:t>–2</a:t>
             </a:r>
             <a:r>
-              <a:rPr lang="en-US" sz="900"/>
+              <a:rPr lang="en-US" sz="900">
+                <a:latin typeface="Arial"/>
+                <a:cs typeface="Arial"/>
+              </a:rPr>
               <a:t> μm</a:t>
             </a:r>
             <a:r>
-              <a:rPr lang="en-US" sz="900" baseline="30000"/>
+              <a:rPr lang="en-US" sz="900" baseline="30000">
+                <a:latin typeface="Arial"/>
+                <a:cs typeface="Arial"/>
+              </a:rPr>
               <a:t>2</a:t>
             </a:r>
             <a:r>
-              <a:rPr lang="en-US" sz="900"/>
+              <a:rPr lang="en-US" sz="900">
+                <a:latin typeface="Arial"/>
+                <a:cs typeface="Arial"/>
+              </a:rPr>
               <a:t>ms</a:t>
             </a:r>
             <a:r>
-              <a:rPr lang="en-US" sz="900" baseline="30000"/>
+              <a:rPr lang="en-US" sz="900" baseline="30000">
+                <a:latin typeface="Arial"/>
+                <a:cs typeface="Arial"/>
+              </a:rPr>
               <a:t>–1</a:t>
             </a:r>
             <a:r>
-              <a:rPr lang="en-US" sz="900"/>
+              <a:rPr lang="en-US" sz="900">
+                <a:latin typeface="Arial"/>
+                <a:cs typeface="Arial"/>
+              </a:rPr>
               <a:t>	10</a:t>
             </a:r>
             <a:r>
-              <a:rPr lang="en-US" sz="900" baseline="30000"/>
+              <a:rPr lang="en-US" sz="900" baseline="30000">
+                <a:latin typeface="Arial"/>
+                <a:cs typeface="Arial"/>
+              </a:rPr>
               <a:t>–3</a:t>
             </a:r>
             <a:r>
-              <a:rPr lang="en-US" sz="900"/>
+              <a:rPr lang="en-US" sz="900">
+                <a:latin typeface="Arial"/>
+                <a:cs typeface="Arial"/>
+              </a:rPr>
               <a:t> ms</a:t>
             </a:r>
             <a:r>
-              <a:rPr lang="en-US" sz="900" baseline="30000"/>
+              <a:rPr lang="en-US" sz="900" baseline="30000">
+                <a:latin typeface="Arial"/>
+                <a:cs typeface="Arial"/>
+              </a:rPr>
               <a:t>–1</a:t>
             </a:r>
             <a:r>
-              <a:rPr lang="en-US" sz="900"/>
-              <a:t>           </a:t>
-            </a:r>
-            <a:r>
-              <a:rPr lang="en-US" sz="900"/>
+              <a:rPr lang="en-US" sz="900">
+                <a:latin typeface="Arial"/>
+                <a:cs typeface="Arial"/>
+              </a:rPr>
+              <a:t>	</a:t>
+            </a:r>
+            <a:r>
+              <a:rPr lang="en-US" sz="900">
+                <a:latin typeface="Arial"/>
+                <a:cs typeface="Arial"/>
+              </a:rPr>
               <a:t>1.7x10</a:t>
             </a:r>
             <a:r>
-              <a:rPr lang="en-US" sz="900" baseline="30000"/>
+              <a:rPr lang="en-US" sz="900" baseline="30000">
+                <a:latin typeface="Arial"/>
+                <a:cs typeface="Arial"/>
+              </a:rPr>
               <a:t>–7</a:t>
             </a:r>
             <a:r>
-              <a:rPr lang="en-US" sz="900"/>
+              <a:rPr lang="en-US" sz="900">
+                <a:latin typeface="Arial"/>
+                <a:cs typeface="Arial"/>
+              </a:rPr>
               <a:t> μm</a:t>
             </a:r>
             <a:r>
-              <a:rPr lang="en-US" sz="900" baseline="30000"/>
+              <a:rPr lang="en-US" sz="900" baseline="30000">
+                <a:latin typeface="Arial"/>
+                <a:cs typeface="Arial"/>
+              </a:rPr>
               <a:t>3</a:t>
             </a:r>
             <a:r>
-              <a:rPr lang="en-US" sz="900"/>
+              <a:rPr lang="en-US" sz="900">
+                <a:latin typeface="Arial"/>
+                <a:cs typeface="Arial"/>
+              </a:rPr>
               <a:t>ms</a:t>
             </a:r>
             <a:r>
-              <a:rPr lang="en-US" sz="900" baseline="30000"/>
-              <a:t>–1         </a:t>
-            </a:r>
-            <a:r>
-              <a:rPr lang="en-US" sz="900"/>
+              <a:rPr lang="en-US" sz="900" baseline="30000">
+                <a:latin typeface="Arial"/>
+                <a:cs typeface="Arial"/>
+              </a:rPr>
+              <a:t>–1 </a:t>
+            </a:r>
+            <a:r>
+              <a:rPr lang="en-US" sz="900">
+                <a:latin typeface="Arial"/>
+                <a:cs typeface="Arial"/>
+              </a:rPr>
+              <a:t>  10</a:t>
+            </a:r>
+            <a:r>
+              <a:rPr lang="en-US" sz="900" baseline="30000">
+                <a:latin typeface="Arial"/>
+                <a:cs typeface="Arial"/>
+              </a:rPr>
+              <a:t>–3</a:t>
+            </a:r>
+            <a:r>
+              <a:rPr lang="en-US" sz="900">
+                <a:latin typeface="Arial"/>
+                <a:cs typeface="Arial"/>
+              </a:rPr>
+              <a:t> μm ms</a:t>
+            </a:r>
+            <a:r>
+              <a:rPr lang="en-US" sz="900" baseline="30000">
+                <a:latin typeface="Arial"/>
+                <a:cs typeface="Arial"/>
+              </a:rPr>
+              <a:t>–1</a:t>
+            </a:r>
+            <a:endParaRPr lang="en-US" sz="900">
+              <a:latin typeface="Arial"/>
+              <a:cs typeface="Arial"/>
+            </a:endParaRPr>
+          </a:p>
+          <a:p>
+            <a:r>
+              <a:rPr lang="en-US" sz="900">
+                <a:latin typeface="Arial"/>
+                <a:cs typeface="Arial"/>
+              </a:rPr>
+              <a:t>μm-s	6000 μm</a:t>
+            </a:r>
+            <a:r>
+              <a:rPr lang="en-US" sz="900" baseline="30000">
+                <a:latin typeface="Arial"/>
+                <a:cs typeface="Arial"/>
+              </a:rPr>
+              <a:t>–3</a:t>
+            </a:r>
+            <a:r>
+              <a:rPr lang="en-US" sz="900">
+                <a:latin typeface="Arial"/>
+                <a:cs typeface="Arial"/>
+              </a:rPr>
+              <a:t>	10 μm</a:t>
+            </a:r>
+            <a:r>
+              <a:rPr lang="en-US" sz="900" baseline="30000">
+                <a:latin typeface="Arial"/>
+                <a:cs typeface="Arial"/>
+              </a:rPr>
+              <a:t>2</a:t>
+            </a:r>
+            <a:r>
+              <a:rPr lang="en-US" sz="900">
+                <a:latin typeface="Arial"/>
+                <a:cs typeface="Arial"/>
+              </a:rPr>
+              <a:t>s</a:t>
+            </a:r>
+            <a:r>
+              <a:rPr lang="en-US" sz="900" baseline="30000">
+                <a:latin typeface="Arial"/>
+                <a:cs typeface="Arial"/>
+              </a:rPr>
+              <a:t>–1</a:t>
+            </a:r>
+            <a:r>
+              <a:rPr lang="en-US" sz="900">
+                <a:latin typeface="Arial"/>
+                <a:cs typeface="Arial"/>
+              </a:rPr>
+              <a:t>	1 s</a:t>
+            </a:r>
+            <a:r>
+              <a:rPr lang="en-US" sz="900" baseline="30000">
+                <a:latin typeface="Arial"/>
+                <a:cs typeface="Arial"/>
+              </a:rPr>
+              <a:t>–1</a:t>
+            </a:r>
+            <a:r>
+              <a:rPr lang="en-US" sz="900">
+                <a:latin typeface="Arial"/>
+                <a:cs typeface="Arial"/>
+              </a:rPr>
+              <a:t>		1.7x10</a:t>
+            </a:r>
+            <a:r>
+              <a:rPr lang="en-US" sz="900" baseline="30000">
+                <a:latin typeface="Arial"/>
+                <a:cs typeface="Arial"/>
+              </a:rPr>
+              <a:t>–4</a:t>
+            </a:r>
+            <a:r>
+              <a:rPr lang="en-US" sz="900">
+                <a:latin typeface="Arial"/>
+                <a:cs typeface="Arial"/>
+              </a:rPr>
+              <a:t> μm</a:t>
+            </a:r>
+            <a:r>
+              <a:rPr lang="en-US" sz="900" baseline="30000">
+                <a:latin typeface="Arial"/>
+                <a:cs typeface="Arial"/>
+              </a:rPr>
+              <a:t>3</a:t>
+            </a:r>
+            <a:r>
+              <a:rPr lang="en-US" sz="900">
+                <a:latin typeface="Arial"/>
+                <a:cs typeface="Arial"/>
+              </a:rPr>
+              <a:t>s</a:t>
+            </a:r>
+            <a:r>
+              <a:rPr lang="en-US" sz="900" baseline="30000">
+                <a:latin typeface="Arial"/>
+                <a:cs typeface="Arial"/>
+              </a:rPr>
+              <a:t>–1</a:t>
+            </a:r>
+            <a:r>
+              <a:rPr lang="en-US" sz="900">
+                <a:latin typeface="Arial"/>
+                <a:cs typeface="Arial"/>
+              </a:rPr>
+              <a:t>	  </a:t>
+            </a:r>
+            <a:r>
+              <a:rPr lang="en-US" sz="900">
+                <a:latin typeface="Arial"/>
+                <a:cs typeface="Arial"/>
+              </a:rPr>
+              <a:t>1 μm s</a:t>
+            </a:r>
+            <a:r>
+              <a:rPr lang="en-US" sz="900" baseline="30000">
+                <a:latin typeface="Arial"/>
+                <a:cs typeface="Arial"/>
+              </a:rPr>
+              <a:t>–1</a:t>
+            </a:r>
+            <a:endParaRPr lang="en-US" sz="900">
+              <a:latin typeface="Arial"/>
+              <a:cs typeface="Arial"/>
+            </a:endParaRPr>
+          </a:p>
+          <a:p>
+            <a:r>
+              <a:rPr lang="en-US" sz="900">
+                <a:latin typeface="Arial"/>
+                <a:cs typeface="Arial"/>
+              </a:rPr>
+              <a:t>nm-ms	6x10</a:t>
+            </a:r>
+            <a:r>
+              <a:rPr lang="en-US" sz="900" baseline="30000">
+                <a:latin typeface="Arial"/>
+                <a:cs typeface="Arial"/>
+              </a:rPr>
+              <a:t>–6</a:t>
+            </a:r>
+            <a:r>
+              <a:rPr lang="en-US" sz="900">
+                <a:latin typeface="Arial"/>
+                <a:cs typeface="Arial"/>
+              </a:rPr>
+              <a:t> nm</a:t>
+            </a:r>
+            <a:r>
+              <a:rPr lang="en-US" sz="900" baseline="30000">
+                <a:latin typeface="Arial"/>
+                <a:cs typeface="Arial"/>
+              </a:rPr>
+              <a:t>–3</a:t>
+            </a:r>
+            <a:r>
+              <a:rPr lang="en-US" sz="900">
+                <a:latin typeface="Arial"/>
+                <a:cs typeface="Arial"/>
+              </a:rPr>
+              <a:t>	10</a:t>
+            </a:r>
+            <a:r>
+              <a:rPr lang="en-US" sz="900" baseline="30000">
+                <a:latin typeface="Arial"/>
+                <a:cs typeface="Arial"/>
+              </a:rPr>
+              <a:t>4</a:t>
+            </a:r>
+            <a:r>
+              <a:rPr lang="en-US" sz="900">
+                <a:latin typeface="Arial"/>
+                <a:cs typeface="Arial"/>
+              </a:rPr>
+              <a:t> nm</a:t>
+            </a:r>
+            <a:r>
+              <a:rPr lang="en-US" sz="900" baseline="30000">
+                <a:latin typeface="Arial"/>
+                <a:cs typeface="Arial"/>
+              </a:rPr>
+              <a:t>2</a:t>
+            </a:r>
+            <a:r>
+              <a:rPr lang="en-US" sz="900">
+                <a:latin typeface="Arial"/>
+                <a:cs typeface="Arial"/>
+              </a:rPr>
+              <a:t>ms</a:t>
+            </a:r>
+            <a:r>
+              <a:rPr lang="en-US" sz="900" baseline="30000">
+                <a:latin typeface="Arial"/>
+                <a:cs typeface="Arial"/>
+              </a:rPr>
+              <a:t>–1</a:t>
+            </a:r>
+            <a:r>
+              <a:rPr lang="en-US" sz="900">
+                <a:latin typeface="Arial"/>
+                <a:cs typeface="Arial"/>
+              </a:rPr>
+              <a:t>	10</a:t>
+            </a:r>
+            <a:r>
+              <a:rPr lang="en-US" sz="900" baseline="30000">
+                <a:latin typeface="Arial"/>
+                <a:cs typeface="Arial"/>
+              </a:rPr>
+              <a:t>–3</a:t>
+            </a:r>
+            <a:r>
+              <a:rPr lang="en-US" sz="900">
+                <a:latin typeface="Arial"/>
+                <a:cs typeface="Arial"/>
+              </a:rPr>
+              <a:t> ms</a:t>
+            </a:r>
+            <a:r>
+              <a:rPr lang="en-US" sz="900" baseline="30000">
+                <a:latin typeface="Arial"/>
+                <a:cs typeface="Arial"/>
+              </a:rPr>
+              <a:t>–1</a:t>
+            </a:r>
+            <a:r>
+              <a:rPr lang="en-US" sz="900">
+                <a:latin typeface="Arial"/>
+                <a:cs typeface="Arial"/>
+              </a:rPr>
+              <a:t>	170 nm</a:t>
+            </a:r>
+            <a:r>
+              <a:rPr lang="en-US" sz="900" baseline="30000">
+                <a:latin typeface="Arial"/>
+                <a:cs typeface="Arial"/>
+              </a:rPr>
+              <a:t>3</a:t>
+            </a:r>
+            <a:r>
+              <a:rPr lang="en-US" sz="900">
+                <a:latin typeface="Arial"/>
+                <a:cs typeface="Arial"/>
+              </a:rPr>
+              <a:t>ms</a:t>
+            </a:r>
+            <a:r>
+              <a:rPr lang="en-US" sz="900" baseline="30000">
+                <a:latin typeface="Arial"/>
+                <a:cs typeface="Arial"/>
+              </a:rPr>
+              <a:t>–1</a:t>
+            </a:r>
+            <a:r>
+              <a:rPr lang="en-US" sz="900">
+                <a:latin typeface="Arial"/>
+                <a:cs typeface="Arial"/>
+              </a:rPr>
+              <a:t>	  </a:t>
+            </a:r>
+            <a:r>
+              <a:rPr lang="en-US" sz="900">
+                <a:latin typeface="Arial"/>
+                <a:cs typeface="Arial"/>
+              </a:rPr>
+              <a:t>1 nm ms</a:t>
+            </a:r>
+            <a:r>
+              <a:rPr lang="en-US" sz="900" baseline="30000">
+                <a:latin typeface="Arial"/>
+                <a:cs typeface="Arial"/>
+              </a:rPr>
+              <a:t>–1</a:t>
+            </a:r>
+            <a:endParaRPr lang="en-US" sz="900">
+              <a:latin typeface="Arial"/>
+              <a:cs typeface="Arial"/>
+            </a:endParaRPr>
+          </a:p>
+          <a:p>
+            <a:r>
+              <a:rPr lang="en-US" sz="900">
+                <a:latin typeface="Arial"/>
+                <a:cs typeface="Arial"/>
+              </a:rPr>
+              <a:t>nm-μs	6x10</a:t>
+            </a:r>
+            <a:r>
+              <a:rPr lang="en-US" sz="900" baseline="30000">
+                <a:latin typeface="Arial"/>
+                <a:cs typeface="Arial"/>
+              </a:rPr>
+              <a:t>–6</a:t>
+            </a:r>
+            <a:r>
+              <a:rPr lang="en-US" sz="900">
+                <a:latin typeface="Arial"/>
+                <a:cs typeface="Arial"/>
+              </a:rPr>
+              <a:t> nm</a:t>
+            </a:r>
+            <a:r>
+              <a:rPr lang="en-US" sz="900" baseline="30000">
+                <a:latin typeface="Arial"/>
+                <a:cs typeface="Arial"/>
+              </a:rPr>
+              <a:t>–3</a:t>
+            </a:r>
+            <a:r>
+              <a:rPr lang="en-US" sz="900">
+                <a:latin typeface="Arial"/>
+                <a:cs typeface="Arial"/>
+              </a:rPr>
+              <a:t>	10 nm</a:t>
+            </a:r>
+            <a:r>
+              <a:rPr lang="en-US" sz="900" baseline="30000">
+                <a:latin typeface="Arial"/>
+                <a:cs typeface="Arial"/>
+              </a:rPr>
+              <a:t>2</a:t>
+            </a:r>
+            <a:r>
+              <a:rPr lang="en-US" sz="900">
+                <a:latin typeface="Arial"/>
+                <a:cs typeface="Arial"/>
+              </a:rPr>
+              <a:t>μs</a:t>
+            </a:r>
+            <a:r>
+              <a:rPr lang="en-US" sz="900" baseline="30000">
+                <a:latin typeface="Arial"/>
+                <a:cs typeface="Arial"/>
+              </a:rPr>
+              <a:t>–1</a:t>
+            </a:r>
+            <a:r>
+              <a:rPr lang="en-US" sz="900">
+                <a:latin typeface="Arial"/>
+                <a:cs typeface="Arial"/>
+              </a:rPr>
+              <a:t>	10</a:t>
+            </a:r>
+            <a:r>
+              <a:rPr lang="en-US" sz="900" baseline="30000">
+                <a:latin typeface="Arial"/>
+                <a:cs typeface="Arial"/>
+              </a:rPr>
+              <a:t>–6</a:t>
+            </a:r>
+            <a:r>
+              <a:rPr lang="en-US" sz="900">
+                <a:latin typeface="Arial"/>
+                <a:cs typeface="Arial"/>
+              </a:rPr>
+              <a:t> μs</a:t>
+            </a:r>
+            <a:r>
+              <a:rPr lang="en-US" sz="900" baseline="30000">
+                <a:latin typeface="Arial"/>
+                <a:cs typeface="Arial"/>
+              </a:rPr>
+              <a:t>–1</a:t>
+            </a:r>
+            <a:r>
+              <a:rPr lang="en-US" sz="900">
+                <a:latin typeface="Arial"/>
+                <a:cs typeface="Arial"/>
+              </a:rPr>
+              <a:t>		</a:t>
+            </a:r>
+            <a:r>
+              <a:rPr lang="en-US" sz="900">
+                <a:latin typeface="Arial"/>
+                <a:cs typeface="Arial"/>
+              </a:rPr>
+              <a:t>0.17 nm</a:t>
+            </a:r>
+            <a:r>
+              <a:rPr lang="en-US" sz="900" baseline="30000">
+                <a:latin typeface="Arial"/>
+                <a:cs typeface="Arial"/>
+              </a:rPr>
+              <a:t>3</a:t>
+            </a:r>
+            <a:r>
+              <a:rPr lang="en-US" sz="900">
+                <a:latin typeface="Arial"/>
+                <a:cs typeface="Arial"/>
+              </a:rPr>
+              <a:t>μs</a:t>
+            </a:r>
+            <a:r>
+              <a:rPr lang="en-US" sz="900" baseline="30000">
+                <a:latin typeface="Arial"/>
+                <a:cs typeface="Arial"/>
+              </a:rPr>
+              <a:t>–1</a:t>
+            </a:r>
+            <a:r>
+              <a:rPr lang="en-US" sz="900">
+                <a:latin typeface="Arial"/>
+                <a:cs typeface="Arial"/>
+              </a:rPr>
+              <a:t>	  </a:t>
+            </a:r>
+            <a:r>
+              <a:rPr lang="en-US" sz="900">
+                <a:latin typeface="Arial"/>
+                <a:cs typeface="Arial"/>
+              </a:rPr>
               <a:t>10</a:t>
             </a:r>
             <a:r>
-              <a:rPr lang="en-US" sz="900" baseline="30000"/>
+              <a:rPr lang="en-US" sz="900" baseline="30000">
+                <a:latin typeface="Arial"/>
+                <a:cs typeface="Arial"/>
+              </a:rPr>
               <a:t>–3</a:t>
             </a:r>
             <a:r>
-              <a:rPr lang="en-US" sz="900"/>
-              <a:t> μm ms</a:t>
-            </a:r>
-            <a:r>
-              <a:rPr lang="en-US" sz="900" baseline="30000"/>
+              <a:rPr lang="en-US" sz="900">
+                <a:latin typeface="Arial"/>
+                <a:cs typeface="Arial"/>
+              </a:rPr>
+              <a:t> nm μs</a:t>
+            </a:r>
+            <a:r>
+              <a:rPr lang="en-US" sz="900" baseline="30000">
+                <a:latin typeface="Arial"/>
+                <a:cs typeface="Arial"/>
+              </a:rPr>
               <a:t>–1</a:t>
             </a:r>
-            <a:endParaRPr lang="en-US" sz="900"/>
-          </a:p>
-          <a:p>
-            <a:r>
-              <a:rPr lang="en-US" sz="900"/>
-              <a:t>μm-s	6000 μm</a:t>
-            </a:r>
-            <a:r>
-              <a:rPr lang="en-US" sz="900" baseline="30000"/>
-              <a:t>–3</a:t>
-            </a:r>
-            <a:r>
-              <a:rPr lang="en-US" sz="900"/>
-              <a:t>	10 μm</a:t>
-            </a:r>
-            <a:r>
-              <a:rPr lang="en-US" sz="900" baseline="30000"/>
-              <a:t>2</a:t>
-            </a:r>
-            <a:r>
-              <a:rPr lang="en-US" sz="900"/>
-              <a:t>s</a:t>
-            </a:r>
-            <a:r>
-              <a:rPr lang="en-US" sz="900" baseline="30000"/>
-              <a:t>–1</a:t>
-            </a:r>
-            <a:r>
-              <a:rPr lang="en-US" sz="900"/>
-              <a:t>	1 s</a:t>
-            </a:r>
-            <a:r>
-              <a:rPr lang="en-US" sz="900" baseline="30000"/>
-              <a:t>–1</a:t>
-            </a:r>
-            <a:r>
-              <a:rPr lang="en-US" sz="900"/>
-              <a:t>		1.7x10</a:t>
-            </a:r>
-            <a:r>
-              <a:rPr lang="en-US" sz="900" baseline="30000"/>
-              <a:t>–4</a:t>
-            </a:r>
-            <a:r>
-              <a:rPr lang="en-US" sz="900"/>
-              <a:t> μm</a:t>
-            </a:r>
-            <a:r>
-              <a:rPr lang="en-US" sz="900" baseline="30000"/>
-              <a:t>3</a:t>
-            </a:r>
-            <a:r>
-              <a:rPr lang="en-US" sz="900"/>
-              <a:t>s</a:t>
-            </a:r>
-            <a:r>
-              <a:rPr lang="en-US" sz="900" baseline="30000"/>
-              <a:t>–1</a:t>
-            </a:r>
-            <a:r>
-              <a:rPr lang="en-US" sz="900"/>
-              <a:t>	   1 μm s</a:t>
-            </a:r>
-            <a:r>
-              <a:rPr lang="en-US" sz="900" baseline="30000"/>
-              <a:t>–1</a:t>
-            </a:r>
-            <a:endParaRPr lang="en-US" sz="900"/>
-          </a:p>
-          <a:p>
-            <a:r>
-              <a:rPr lang="en-US" sz="900"/>
-              <a:t>nm-ms	6x10</a:t>
-            </a:r>
-            <a:r>
-              <a:rPr lang="en-US" sz="900" baseline="30000"/>
-              <a:t>–6</a:t>
-            </a:r>
-            <a:r>
-              <a:rPr lang="en-US" sz="900"/>
-              <a:t> nm</a:t>
-            </a:r>
-            <a:r>
-              <a:rPr lang="en-US" sz="900" baseline="30000"/>
-              <a:t>–3</a:t>
-            </a:r>
-            <a:r>
-              <a:rPr lang="en-US" sz="900"/>
-              <a:t>	10</a:t>
-            </a:r>
-            <a:r>
-              <a:rPr lang="en-US" sz="900" baseline="30000"/>
-              <a:t>4</a:t>
-            </a:r>
-            <a:r>
-              <a:rPr lang="en-US" sz="900"/>
-              <a:t> nm</a:t>
-            </a:r>
-            <a:r>
-              <a:rPr lang="en-US" sz="900" baseline="30000"/>
-              <a:t>2</a:t>
-            </a:r>
-            <a:r>
-              <a:rPr lang="en-US" sz="900"/>
-              <a:t>ms</a:t>
-            </a:r>
-            <a:r>
-              <a:rPr lang="en-US" sz="900" baseline="30000"/>
-              <a:t>–1</a:t>
-            </a:r>
-            <a:r>
-              <a:rPr lang="en-US" sz="900"/>
-              <a:t>	10</a:t>
-            </a:r>
-            <a:r>
-              <a:rPr lang="en-US" sz="900" baseline="30000"/>
-              <a:t>–3</a:t>
-            </a:r>
-            <a:r>
-              <a:rPr lang="en-US" sz="900"/>
-              <a:t> ms</a:t>
-            </a:r>
-            <a:r>
-              <a:rPr lang="en-US" sz="900" baseline="30000"/>
-              <a:t>–1</a:t>
-            </a:r>
-            <a:r>
-              <a:rPr lang="en-US" sz="900"/>
-              <a:t>	170 nm</a:t>
-            </a:r>
-            <a:r>
-              <a:rPr lang="en-US" sz="900" baseline="30000"/>
-              <a:t>3</a:t>
-            </a:r>
-            <a:r>
-              <a:rPr lang="en-US" sz="900"/>
-              <a:t>ms</a:t>
-            </a:r>
-            <a:r>
-              <a:rPr lang="en-US" sz="900" baseline="30000"/>
-              <a:t>–1</a:t>
-            </a:r>
-            <a:r>
-              <a:rPr lang="en-US" sz="900"/>
-              <a:t>	   1 nm ms</a:t>
-            </a:r>
-            <a:r>
-              <a:rPr lang="en-US" sz="900" baseline="30000"/>
-              <a:t>–1</a:t>
-            </a:r>
-            <a:endParaRPr lang="en-US" sz="900"/>
-          </a:p>
-          <a:p>
-            <a:r>
-              <a:rPr lang="en-US" sz="900"/>
-              <a:t>nm-μs	6x10</a:t>
-            </a:r>
-            <a:r>
-              <a:rPr lang="en-US" sz="900" baseline="30000"/>
-              <a:t>–6</a:t>
-            </a:r>
-            <a:r>
-              <a:rPr lang="en-US" sz="900"/>
-              <a:t> nm</a:t>
-            </a:r>
-            <a:r>
-              <a:rPr lang="en-US" sz="900" baseline="30000"/>
-              <a:t>–3</a:t>
-            </a:r>
-            <a:r>
-              <a:rPr lang="en-US" sz="900"/>
-              <a:t>	10 nm</a:t>
-            </a:r>
-            <a:r>
-              <a:rPr lang="en-US" sz="900" baseline="30000"/>
-              <a:t>2</a:t>
-            </a:r>
-            <a:r>
-              <a:rPr lang="en-US" sz="900"/>
-              <a:t>μs</a:t>
-            </a:r>
-            <a:r>
-              <a:rPr lang="en-US" sz="900" baseline="30000"/>
-              <a:t>–1</a:t>
-            </a:r>
-            <a:r>
-              <a:rPr lang="en-US" sz="900"/>
-              <a:t>	10</a:t>
-            </a:r>
-            <a:r>
-              <a:rPr lang="en-US" sz="900" baseline="30000"/>
-              <a:t>–6</a:t>
-            </a:r>
-            <a:r>
-              <a:rPr lang="en-US" sz="900"/>
-              <a:t> μs</a:t>
-            </a:r>
-            <a:r>
-              <a:rPr lang="en-US" sz="900" baseline="30000"/>
-              <a:t>–1</a:t>
-            </a:r>
-            <a:r>
-              <a:rPr lang="en-US" sz="900"/>
-              <a:t>	             0.17 nm</a:t>
-            </a:r>
-            <a:r>
-              <a:rPr lang="en-US" sz="900" baseline="30000"/>
-              <a:t>3</a:t>
-            </a:r>
-            <a:r>
-              <a:rPr lang="en-US" sz="900"/>
-              <a:t>μs</a:t>
-            </a:r>
-            <a:r>
-              <a:rPr lang="en-US" sz="900" baseline="30000"/>
-              <a:t>–1</a:t>
-            </a:r>
-            <a:r>
-              <a:rPr lang="en-US" sz="900"/>
-              <a:t>	 10</a:t>
-            </a:r>
-            <a:r>
-              <a:rPr lang="en-US" sz="900" baseline="30000"/>
-              <a:t>–3</a:t>
-            </a:r>
-            <a:r>
-              <a:rPr lang="en-US" sz="900"/>
-              <a:t> nm μs</a:t>
-            </a:r>
-            <a:r>
-              <a:rPr lang="en-US" sz="900" baseline="30000"/>
-              <a:t>–1</a:t>
-            </a:r>
-            <a:endParaRPr lang="en-US" sz="900"/>
-          </a:p>
-          <a:p>
-            <a:endParaRPr lang="en-US"/>
+            <a:endParaRPr lang="en-US" sz="900">
+              <a:latin typeface="Arial"/>
+              <a:cs typeface="Arial"/>
+            </a:endParaRPr>
+          </a:p>
+          <a:p>
+            <a:endParaRPr lang="en-US" sz="900">
+              <a:latin typeface="Arial"/>
+              <a:cs typeface="Arial"/>
+            </a:endParaRPr>
           </a:p>
         </p:txBody>
       </p:sp>
@@ -6018,7 +6598,10 @@
           <a:lstStyle/>
           <a:p>
             <a:r>
-              <a:rPr lang="en-US" sz="900"/>
+              <a:rPr lang="en-US" sz="900">
+                <a:latin typeface="Arial"/>
+                <a:cs typeface="Arial"/>
+              </a:rPr>
               <a:t>maroon  olive  royal  darkred  red  green  sky  darkorange  scarlet  chartrouse  aquamarine  darkyellow  rose  khaki  violet  darkgreen  brick  purple  mauve  darkblue  pink  magenta  orchid  darkviolet  brown  fuchsia  plum  lightred  tan  lime  azure   lightorange  sienna  teal  black  lightyellow  orange  aqua  gray  lightgreen  salmon  cyan  grey  lightblue  coral  blue  silver  lightviolet  yellow  navy  slate  gold  turquoise  white</a:t>
             </a:r>
           </a:p>
@@ -6122,77 +6705,118 @@
           <a:lstStyle/>
           <a:p>
             <a:r>
-              <a:rPr lang="en-US" sz="900" u="sng"/>
+              <a:rPr lang="en-US" sz="900" u="sng">
+                <a:latin typeface="Arial"/>
+                <a:cs typeface="Arial"/>
+              </a:rPr>
               <a:t>Key	function</a:t>
             </a:r>
-            <a:endParaRPr lang="en-US" sz="900"/>
-          </a:p>
-          <a:p>
-            <a:r>
-              <a:rPr lang="en-US" sz="900"/>
+            <a:endParaRPr lang="en-US" sz="900">
+              <a:latin typeface="Arial"/>
+              <a:cs typeface="Arial"/>
+            </a:endParaRPr>
+          </a:p>
+          <a:p>
+            <a:r>
+              <a:rPr lang="en-US" sz="900">
+                <a:latin typeface="Arial"/>
+                <a:cs typeface="Arial"/>
+              </a:rPr>
               <a:t>space	toggle pause mode between on and off</a:t>
             </a:r>
           </a:p>
           <a:p>
             <a:r>
-              <a:rPr lang="en-US" sz="900"/>
+              <a:rPr lang="en-US" sz="900">
+                <a:latin typeface="Arial"/>
+                <a:cs typeface="Arial"/>
+              </a:rPr>
               <a:t>Q	quit</a:t>
             </a:r>
           </a:p>
           <a:p>
             <a:r>
-              <a:rPr lang="en-US" sz="900"/>
+              <a:rPr lang="en-US" sz="900">
+                <a:latin typeface="Arial"/>
+                <a:cs typeface="Arial"/>
+              </a:rPr>
               <a:t>T	save image as TIFF file</a:t>
             </a:r>
           </a:p>
           <a:p>
             <a:r>
-              <a:rPr lang="en-US" sz="900"/>
+              <a:rPr lang="en-US" sz="900">
+                <a:latin typeface="Arial"/>
+                <a:cs typeface="Arial"/>
+              </a:rPr>
               <a:t>0	reset view to default</a:t>
             </a:r>
           </a:p>
           <a:p>
             <a:r>
-              <a:rPr lang="en-US" sz="900"/>
+              <a:rPr lang="en-US" sz="900">
+                <a:latin typeface="Arial"/>
+                <a:cs typeface="Arial"/>
+              </a:rPr>
               <a:t>arrows	rotate object</a:t>
             </a:r>
           </a:p>
           <a:p>
             <a:r>
-              <a:rPr lang="en-US" sz="900"/>
+              <a:rPr lang="en-US" sz="900">
+                <a:latin typeface="Arial"/>
+                <a:cs typeface="Arial"/>
+              </a:rPr>
               <a:t>shift, arrows	pan object</a:t>
             </a:r>
           </a:p>
           <a:p>
             <a:r>
-              <a:rPr lang="en-US" sz="900"/>
+              <a:rPr lang="en-US" sz="900">
+                <a:latin typeface="Arial"/>
+                <a:cs typeface="Arial"/>
+              </a:rPr>
               <a:t>=	zoom in</a:t>
             </a:r>
           </a:p>
           <a:p>
             <a:r>
-              <a:rPr lang="en-US" sz="900"/>
+              <a:rPr lang="en-US" sz="900">
+                <a:latin typeface="Arial"/>
+                <a:cs typeface="Arial"/>
+              </a:rPr>
               <a:t>-	zoom out</a:t>
             </a:r>
           </a:p>
           <a:p>
             <a:r>
-              <a:rPr lang="en-US" sz="900"/>
+              <a:rPr lang="en-US" sz="900">
+                <a:latin typeface="Arial"/>
+                <a:cs typeface="Arial"/>
+              </a:rPr>
               <a:t>x,y,z	rotate counterclockwise about object axis</a:t>
             </a:r>
           </a:p>
           <a:p>
             <a:r>
-              <a:rPr lang="en-US" sz="900"/>
+              <a:rPr lang="en-US" sz="900">
+                <a:latin typeface="Arial"/>
+                <a:cs typeface="Arial"/>
+              </a:rPr>
               <a:t>X,Y,Z	rotate clockwise about object axis</a:t>
             </a:r>
             <a:r>
               <a:rPr lang="en-US" sz="900">
                 <a:effectLst/>
+                <a:latin typeface="Arial"/>
+                <a:cs typeface="Arial"/>
               </a:rPr>
               <a:t> </a:t>
             </a:r>
-            <a:endParaRPr lang="en-US" sz="900"/>
+            <a:endParaRPr lang="en-US" sz="900">
+              <a:latin typeface="Arial"/>
+              <a:cs typeface="Arial"/>
+            </a:endParaRPr>
           </a:p>
         </p:txBody>
       </p:sp>
@@ -6219,56 +6843,86 @@
           <a:lstStyle/>
           <a:p>
             <a:r>
-              <a:rPr lang="en-US" sz="900" u="sng"/>
+              <a:rPr lang="en-US" sz="900" u="sng">
+                <a:latin typeface="Arial"/>
+                <a:cs typeface="Arial"/>
+              </a:rPr>
               <a:t>flag	result</a:t>
             </a:r>
-            <a:endParaRPr lang="en-US" sz="900"/>
-          </a:p>
-          <a:p>
-            <a:r>
-              <a:rPr lang="en-US" sz="900"/>
+            <a:endParaRPr lang="en-US" sz="900">
+              <a:latin typeface="Arial"/>
+              <a:cs typeface="Arial"/>
+            </a:endParaRPr>
+          </a:p>
+          <a:p>
+            <a:r>
+              <a:rPr lang="en-US" sz="900">
+                <a:latin typeface="Arial"/>
+                <a:cs typeface="Arial"/>
+              </a:rPr>
               <a:t>	normal: parameters displayed and simulation run</a:t>
             </a:r>
           </a:p>
           <a:p>
             <a:r>
-              <a:rPr lang="en-US" sz="900"/>
+              <a:rPr lang="en-US" sz="900">
+                <a:latin typeface="Arial"/>
+                <a:cs typeface="Arial"/>
+              </a:rPr>
               <a:t>-o	suppress output: text output files are not opened</a:t>
             </a:r>
           </a:p>
           <a:p>
             <a:r>
-              <a:rPr lang="en-US" sz="900"/>
+              <a:rPr lang="en-US" sz="900">
+                <a:latin typeface="Arial"/>
+                <a:cs typeface="Arial"/>
+              </a:rPr>
               <a:t>-p	parameters only: simulation is not run</a:t>
             </a:r>
           </a:p>
           <a:p>
             <a:r>
-              <a:rPr lang="en-US" sz="900"/>
+              <a:rPr lang="en-US" sz="900">
+                <a:latin typeface="Arial"/>
+                <a:cs typeface="Arial"/>
+              </a:rPr>
               <a:t>-q	quiet: parameters are not displayed</a:t>
             </a:r>
           </a:p>
           <a:p>
             <a:r>
-              <a:rPr lang="en-US" sz="900"/>
+              <a:rPr lang="en-US" sz="900">
+                <a:latin typeface="Arial"/>
+                <a:cs typeface="Arial"/>
+              </a:rPr>
               <a:t>-t	text only: no graphics are displayed</a:t>
             </a:r>
           </a:p>
           <a:p>
             <a:r>
-              <a:rPr lang="en-US" sz="900"/>
+              <a:rPr lang="en-US" sz="900">
+                <a:latin typeface="Arial"/>
+                <a:cs typeface="Arial"/>
+              </a:rPr>
               <a:t>-V	display version number and quit</a:t>
             </a:r>
           </a:p>
           <a:p>
             <a:r>
-              <a:rPr lang="en-US" sz="900"/>
+              <a:rPr lang="en-US" sz="900">
+                <a:latin typeface="Arial"/>
+                <a:cs typeface="Arial"/>
+              </a:rPr>
               <a:t>-v	verbose: extra parameter information is displayed</a:t>
             </a:r>
           </a:p>
           <a:p>
             <a:r>
-              <a:rPr lang="en-US" sz="900"/>
+              <a:rPr lang="en-US" sz="900">
+                <a:latin typeface="Arial"/>
+                <a:cs typeface="Arial"/>
+              </a:rPr>
               <a:t>-w	suppress warnings: no warnings are shown</a:t>
             </a:r>
           </a:p>
@@ -6447,102 +7101,174 @@
           <a:lstStyle/>
           <a:p>
             <a:r>
-              <a:rPr lang="en-US" sz="900" u="sng"/>
+              <a:rPr lang="en-US" sz="900" u="sng">
+                <a:latin typeface="Arial"/>
+                <a:cs typeface="Arial"/>
+              </a:rPr>
               <a:t>integer queue</a:t>
             </a:r>
-            <a:endParaRPr lang="en-US" sz="900"/>
-          </a:p>
-          <a:p>
-            <a:r>
-              <a:rPr lang="en-US" sz="900"/>
+            <a:endParaRPr lang="en-US" sz="900">
+              <a:latin typeface="Arial"/>
+              <a:cs typeface="Arial"/>
+            </a:endParaRPr>
+          </a:p>
+          <a:p>
+            <a:r>
+              <a:rPr lang="en-US" sz="900">
+                <a:latin typeface="Arial"/>
+                <a:cs typeface="Arial"/>
+              </a:rPr>
               <a:t>B	once, before simulation starts</a:t>
             </a:r>
           </a:p>
           <a:p>
             <a:r>
-              <a:rPr lang="en-US" sz="900"/>
+              <a:rPr lang="en-US" sz="900">
+                <a:latin typeface="Arial"/>
+                <a:cs typeface="Arial"/>
+              </a:rPr>
               <a:t>A	once, after simulation ends</a:t>
             </a:r>
           </a:p>
           <a:p>
             <a:r>
-              <a:rPr lang="en-US" sz="900"/>
+              <a:rPr lang="en-US" sz="900">
+                <a:latin typeface="Arial"/>
+                <a:cs typeface="Arial"/>
+              </a:rPr>
               <a:t>@ </a:t>
             </a:r>
             <a:r>
-              <a:rPr lang="en-US" sz="900" i="1"/>
+              <a:rPr lang="en-US" sz="900" i="1">
+                <a:latin typeface="Arial"/>
+                <a:cs typeface="Arial"/>
+              </a:rPr>
               <a:t>i</a:t>
             </a:r>
             <a:r>
-              <a:rPr lang="en-US" sz="900"/>
+              <a:rPr lang="en-US" sz="900">
+                <a:latin typeface="Arial"/>
+                <a:cs typeface="Arial"/>
+              </a:rPr>
               <a:t>	once, at iteration </a:t>
             </a:r>
             <a:r>
-              <a:rPr lang="en-US" sz="900" i="1"/>
+              <a:rPr lang="en-US" sz="900" i="1">
+                <a:latin typeface="Arial"/>
+                <a:cs typeface="Arial"/>
+              </a:rPr>
               <a:t>i</a:t>
             </a:r>
-            <a:endParaRPr lang="en-US" sz="900"/>
-          </a:p>
-          <a:p>
-            <a:r>
-              <a:rPr lang="en-US" sz="900"/>
+            <a:endParaRPr lang="en-US" sz="900">
+              <a:latin typeface="Arial"/>
+              <a:cs typeface="Arial"/>
+            </a:endParaRPr>
+          </a:p>
+          <a:p>
+            <a:r>
+              <a:rPr lang="en-US" sz="900">
+                <a:latin typeface="Arial"/>
+                <a:cs typeface="Arial"/>
+              </a:rPr>
               <a:t>I </a:t>
             </a:r>
             <a:r>
-              <a:rPr lang="en-US" sz="900" i="1"/>
+              <a:rPr lang="en-US" sz="900" i="1">
+                <a:latin typeface="Arial"/>
+                <a:cs typeface="Arial"/>
+              </a:rPr>
               <a:t>on off dt</a:t>
             </a:r>
             <a:r>
-              <a:rPr lang="en-US" sz="900"/>
+              <a:rPr lang="en-US" sz="900">
+                <a:latin typeface="Arial"/>
+                <a:cs typeface="Arial"/>
+              </a:rPr>
               <a:t> every </a:t>
             </a:r>
             <a:r>
-              <a:rPr lang="en-US" sz="900" i="1"/>
+              <a:rPr lang="en-US" sz="900" i="1">
+                <a:latin typeface="Arial"/>
+                <a:cs typeface="Arial"/>
+              </a:rPr>
               <a:t>dti</a:t>
             </a:r>
             <a:r>
-              <a:rPr lang="en-US" sz="900"/>
+              <a:rPr lang="en-US" sz="900">
+                <a:latin typeface="Arial"/>
+                <a:cs typeface="Arial"/>
+              </a:rPr>
               <a:t> iteration, from ≥ </a:t>
             </a:r>
             <a:r>
-              <a:rPr lang="en-US" sz="900" i="1"/>
+              <a:rPr lang="en-US" sz="900" i="1">
+                <a:latin typeface="Arial"/>
+                <a:cs typeface="Arial"/>
+              </a:rPr>
               <a:t>oni</a:t>
             </a:r>
             <a:r>
-              <a:rPr lang="en-US" sz="900"/>
+              <a:rPr lang="en-US" sz="900">
+                <a:latin typeface="Arial"/>
+                <a:cs typeface="Arial"/>
+              </a:rPr>
               <a:t> to ≤ </a:t>
             </a:r>
             <a:r>
-              <a:rPr lang="en-US" sz="900" i="1"/>
+              <a:rPr lang="en-US" sz="900" i="1">
+                <a:latin typeface="Arial"/>
+                <a:cs typeface="Arial"/>
+              </a:rPr>
               <a:t>offi</a:t>
             </a:r>
-            <a:endParaRPr lang="en-US" sz="900"/>
-          </a:p>
-          <a:p>
-            <a:r>
-              <a:rPr lang="en-US" sz="900"/>
+            <a:endParaRPr lang="en-US" sz="900">
+              <a:latin typeface="Arial"/>
+              <a:cs typeface="Arial"/>
+            </a:endParaRPr>
+          </a:p>
+          <a:p>
+            <a:r>
+              <a:rPr lang="en-US" sz="900">
+                <a:latin typeface="Arial"/>
+                <a:cs typeface="Arial"/>
+              </a:rPr>
               <a:t>E	every time step</a:t>
             </a:r>
           </a:p>
           <a:p>
             <a:r>
-              <a:rPr lang="en-US" sz="900"/>
+              <a:rPr lang="en-US" sz="900">
+                <a:latin typeface="Arial"/>
+                <a:cs typeface="Arial"/>
+              </a:rPr>
               <a:t>N </a:t>
             </a:r>
             <a:r>
-              <a:rPr lang="en-US" sz="900" i="1"/>
+              <a:rPr lang="en-US" sz="900" i="1">
+                <a:latin typeface="Arial"/>
+                <a:cs typeface="Arial"/>
+              </a:rPr>
               <a:t>n</a:t>
             </a:r>
             <a:r>
-              <a:rPr lang="en-US" sz="900"/>
+              <a:rPr lang="en-US" sz="900">
+                <a:latin typeface="Arial"/>
+                <a:cs typeface="Arial"/>
+              </a:rPr>
               <a:t>	every </a:t>
             </a:r>
             <a:r>
-              <a:rPr lang="en-US" sz="900" i="1"/>
+              <a:rPr lang="en-US" sz="900" i="1">
+                <a:latin typeface="Arial"/>
+                <a:cs typeface="Arial"/>
+              </a:rPr>
               <a:t>n</a:t>
             </a:r>
             <a:r>
-              <a:rPr lang="en-US" sz="900"/>
+              <a:rPr lang="en-US" sz="900">
+                <a:latin typeface="Arial"/>
+                <a:cs typeface="Arial"/>
+              </a:rPr>
               <a:t> time steps</a:t>
             </a:r>
           </a:p>
@@ -6571,88 +7297,151 @@
           <a:lstStyle/>
           <a:p>
             <a:r>
-              <a:rPr lang="en-US" sz="900" u="sng"/>
+              <a:rPr lang="en-US" sz="900" u="sng">
+                <a:latin typeface="Arial"/>
+                <a:cs typeface="Arial"/>
+              </a:rPr>
               <a:t>continuous time queue</a:t>
             </a:r>
-            <a:endParaRPr lang="en-US" sz="900"/>
-          </a:p>
-          <a:p>
-            <a:r>
-              <a:rPr lang="en-US" sz="900"/>
+            <a:endParaRPr lang="en-US" sz="900">
+              <a:latin typeface="Arial"/>
+              <a:cs typeface="Arial"/>
+            </a:endParaRPr>
+          </a:p>
+          <a:p>
+            <a:r>
+              <a:rPr lang="en-US" sz="900">
+                <a:latin typeface="Arial"/>
+                <a:cs typeface="Arial"/>
+              </a:rPr>
               <a:t>b	       once, before simulation starts</a:t>
             </a:r>
           </a:p>
           <a:p>
             <a:r>
-              <a:rPr lang="en-US" sz="900"/>
+              <a:rPr lang="en-US" sz="900">
+                <a:latin typeface="Arial"/>
+                <a:cs typeface="Arial"/>
+              </a:rPr>
               <a:t>a	       once, after simulation ends</a:t>
             </a:r>
           </a:p>
           <a:p>
             <a:r>
-              <a:rPr lang="en-US" sz="900"/>
+              <a:rPr lang="en-US" sz="900">
+                <a:latin typeface="Arial"/>
+                <a:cs typeface="Arial"/>
+              </a:rPr>
               <a:t>@ </a:t>
             </a:r>
             <a:r>
-              <a:rPr lang="en-US" sz="900" i="1"/>
+              <a:rPr lang="en-US" sz="900" i="1">
+                <a:latin typeface="Arial"/>
+                <a:cs typeface="Arial"/>
+              </a:rPr>
               <a:t>time</a:t>
             </a:r>
             <a:r>
-              <a:rPr lang="en-US" sz="900"/>
+              <a:rPr lang="en-US" sz="900">
+                <a:latin typeface="Arial"/>
+                <a:cs typeface="Arial"/>
+              </a:rPr>
               <a:t>	       once, at ≥ </a:t>
             </a:r>
             <a:r>
-              <a:rPr lang="en-US" sz="900" i="1"/>
+              <a:rPr lang="en-US" sz="900" i="1">
+                <a:latin typeface="Arial"/>
+                <a:cs typeface="Arial"/>
+              </a:rPr>
               <a:t>time</a:t>
             </a:r>
-            <a:endParaRPr lang="en-US" sz="900"/>
-          </a:p>
-          <a:p>
-            <a:r>
-              <a:rPr lang="en-US" sz="900"/>
+            <a:endParaRPr lang="en-US" sz="900">
+              <a:latin typeface="Arial"/>
+              <a:cs typeface="Arial"/>
+            </a:endParaRPr>
+          </a:p>
+          <a:p>
+            <a:r>
+              <a:rPr lang="en-US" sz="900">
+                <a:latin typeface="Arial"/>
+                <a:cs typeface="Arial"/>
+              </a:rPr>
               <a:t>i </a:t>
             </a:r>
             <a:r>
-              <a:rPr lang="en-US" sz="900" i="1"/>
+              <a:rPr lang="en-US" sz="900" i="1">
+                <a:latin typeface="Arial"/>
+                <a:cs typeface="Arial"/>
+              </a:rPr>
               <a:t>on off dt</a:t>
             </a:r>
             <a:r>
-              <a:rPr lang="en-US" sz="900"/>
+              <a:rPr lang="en-US" sz="900">
+                <a:latin typeface="Arial"/>
+                <a:cs typeface="Arial"/>
+              </a:rPr>
               <a:t>       every </a:t>
             </a:r>
             <a:r>
-              <a:rPr lang="en-US" sz="900" i="1"/>
+              <a:rPr lang="en-US" sz="900" i="1">
+                <a:latin typeface="Arial"/>
+                <a:cs typeface="Arial"/>
+              </a:rPr>
               <a:t>dt</a:t>
             </a:r>
             <a:r>
-              <a:rPr lang="en-US" sz="900"/>
+              <a:rPr lang="en-US" sz="900">
+                <a:latin typeface="Arial"/>
+                <a:cs typeface="Arial"/>
+              </a:rPr>
               <a:t>, from ≥ </a:t>
             </a:r>
             <a:r>
-              <a:rPr lang="en-US" sz="900" i="1"/>
+              <a:rPr lang="en-US" sz="900" i="1">
+                <a:latin typeface="Arial"/>
+                <a:cs typeface="Arial"/>
+              </a:rPr>
               <a:t>on</a:t>
             </a:r>
             <a:r>
-              <a:rPr lang="en-US" sz="900"/>
+              <a:rPr lang="en-US" sz="900">
+                <a:latin typeface="Arial"/>
+                <a:cs typeface="Arial"/>
+              </a:rPr>
               <a:t> until ≤ </a:t>
             </a:r>
             <a:r>
-              <a:rPr lang="en-US" sz="900" i="1"/>
+              <a:rPr lang="en-US" sz="900" i="1">
+                <a:latin typeface="Arial"/>
+                <a:cs typeface="Arial"/>
+              </a:rPr>
               <a:t>off</a:t>
             </a:r>
-            <a:endParaRPr lang="en-US" sz="900"/>
-          </a:p>
-          <a:p>
-            <a:r>
-              <a:rPr lang="en-US" sz="900"/>
+            <a:endParaRPr lang="en-US" sz="900">
+              <a:latin typeface="Arial"/>
+              <a:cs typeface="Arial"/>
+            </a:endParaRPr>
+          </a:p>
+          <a:p>
+            <a:r>
+              <a:rPr lang="en-US" sz="900">
+                <a:latin typeface="Arial"/>
+                <a:cs typeface="Arial"/>
+              </a:rPr>
               <a:t>x </a:t>
             </a:r>
             <a:r>
-              <a:rPr lang="en-US" sz="900" i="1"/>
+              <a:rPr lang="en-US" sz="900" i="1">
+                <a:latin typeface="Arial"/>
+                <a:cs typeface="Arial"/>
+              </a:rPr>
               <a:t>on off dt xt</a:t>
             </a:r>
             <a:r>
-              <a:rPr lang="en-US" sz="900"/>
+              <a:rPr lang="en-US" sz="900">
+                <a:latin typeface="Arial"/>
+                <a:cs typeface="Arial"/>
+              </a:rPr>
               <a:t>  geometric progression</a:t>
             </a:r>
           </a:p>
@@ -6828,53 +7617,89 @@
           <a:lstStyle/>
           <a:p>
             <a:r>
-              <a:rPr lang="en-US" sz="900"/>
+              <a:rPr lang="en-US" sz="900">
+                <a:latin typeface="Arial"/>
+                <a:cs typeface="Arial"/>
+              </a:rPr>
               <a:t>Andrews and Bray, </a:t>
             </a:r>
             <a:r>
-              <a:rPr lang="en-US" sz="900" i="1"/>
+              <a:rPr lang="en-US" sz="900" i="1">
+                <a:latin typeface="Arial"/>
+                <a:cs typeface="Arial"/>
+              </a:rPr>
               <a:t>Phys. Biol.</a:t>
             </a:r>
             <a:r>
-              <a:rPr lang="en-US" sz="900"/>
+              <a:rPr lang="en-US" sz="900">
+                <a:latin typeface="Arial"/>
+                <a:cs typeface="Arial"/>
+              </a:rPr>
               <a:t> 1:137, 2004; Andrews, </a:t>
             </a:r>
             <a:r>
-              <a:rPr lang="en-US" sz="900" i="1"/>
+              <a:rPr lang="en-US" sz="900" i="1">
+                <a:latin typeface="Arial"/>
+                <a:cs typeface="Arial"/>
+              </a:rPr>
               <a:t>Phys. Biol.</a:t>
             </a:r>
             <a:r>
-              <a:rPr lang="en-US" sz="900"/>
+              <a:rPr lang="en-US" sz="900">
+                <a:latin typeface="Arial"/>
+                <a:cs typeface="Arial"/>
+              </a:rPr>
               <a:t> 2:111, 2005; Andrews, </a:t>
             </a:r>
             <a:r>
-              <a:rPr lang="en-US" sz="900" i="1"/>
+              <a:rPr lang="en-US" sz="900" i="1">
+                <a:latin typeface="Arial"/>
+                <a:cs typeface="Arial"/>
+              </a:rPr>
               <a:t>Phys. Biol.</a:t>
             </a:r>
             <a:r>
-              <a:rPr lang="en-US" sz="900"/>
+              <a:rPr lang="en-US" sz="900">
+                <a:latin typeface="Arial"/>
+                <a:cs typeface="Arial"/>
+              </a:rPr>
               <a:t> 6:046015, 2009;</a:t>
             </a:r>
           </a:p>
           <a:p>
             <a:r>
-              <a:rPr lang="en-US" sz="900"/>
+              <a:rPr lang="en-US" sz="900">
+                <a:latin typeface="Arial"/>
+                <a:cs typeface="Arial"/>
+              </a:rPr>
               <a:t>Andrews et al. </a:t>
             </a:r>
             <a:r>
-              <a:rPr lang="en-US" sz="900" i="1"/>
+              <a:rPr lang="en-US" sz="900" i="1">
+                <a:latin typeface="Arial"/>
+                <a:cs typeface="Arial"/>
+              </a:rPr>
               <a:t>PLoS Comp. Biol.</a:t>
             </a:r>
             <a:r>
-              <a:rPr lang="en-US" sz="900"/>
+              <a:rPr lang="en-US" sz="900">
+                <a:latin typeface="Arial"/>
+                <a:cs typeface="Arial"/>
+              </a:rPr>
               <a:t> 6:e1000705, 2010; Andrews, </a:t>
             </a:r>
             <a:r>
-              <a:rPr lang="en-US" sz="900" i="1"/>
+              <a:rPr lang="en-US" sz="900" i="1">
+                <a:latin typeface="Arial"/>
+                <a:cs typeface="Arial"/>
+              </a:rPr>
               <a:t>Meth. in Mol. Biol.</a:t>
             </a:r>
             <a:r>
-              <a:rPr lang="en-US" sz="900"/>
+              <a:rPr lang="en-US" sz="900">
+                <a:latin typeface="Arial"/>
+                <a:cs typeface="Arial"/>
+              </a:rPr>
               <a:t> 804:519, 2012.</a:t>
             </a:r>
           </a:p>

</xml_diff>